<commit_message>
Adding updates to the Presentation along with an internal version that is much more detailed.
</commit_message>
<xml_diff>
--- a/Predicting the NFL Game Winner Presentation.pptx
+++ b/Predicting the NFL Game Winner Presentation.pptx
@@ -11,12 +11,14 @@
     <p:sldId id="259" r:id="rId5"/>
     <p:sldId id="260" r:id="rId6"/>
     <p:sldId id="261" r:id="rId7"/>
-    <p:sldId id="265" r:id="rId8"/>
-    <p:sldId id="262" r:id="rId9"/>
-    <p:sldId id="266" r:id="rId10"/>
-    <p:sldId id="267" r:id="rId11"/>
-    <p:sldId id="264" r:id="rId12"/>
-    <p:sldId id="263" r:id="rId13"/>
+    <p:sldId id="269" r:id="rId8"/>
+    <p:sldId id="265" r:id="rId9"/>
+    <p:sldId id="268" r:id="rId10"/>
+    <p:sldId id="262" r:id="rId11"/>
+    <p:sldId id="266" r:id="rId12"/>
+    <p:sldId id="267" r:id="rId13"/>
+    <p:sldId id="264" r:id="rId14"/>
+    <p:sldId id="263" r:id="rId15"/>
   </p:sldIdLst>
   <p:sldSz cx="12192000" cy="6858000"/>
   <p:notesSz cx="6858000" cy="9144000"/>
@@ -115,6 +117,11 @@
       </a:defRPr>
     </a:lvl9pPr>
   </p:defaultTextStyle>
+  <p:extLst>
+    <p:ext uri="{EFAFB233-063F-42B5-8137-9DF3F51BA10A}">
+      <p15:sldGuideLst xmlns:p15="http://schemas.microsoft.com/office/powerpoint/2012/main"/>
+    </p:ext>
+  </p:extLst>
 </p:presentation>
 </file>
 
@@ -304,7 +311,7 @@
           <a:p>
             <a:fld id="{4AAD347D-5ACD-4C99-B74B-A9C85AD731AF}" type="datetimeFigureOut">
               <a:rPr lang="en-US" dirty="0"/>
-              <a:t>3/25/2023</a:t>
+              <a:t>3/26/2023</a:t>
             </a:fld>
             <a:endParaRPr lang="en-US" dirty="0"/>
           </a:p>
@@ -574,7 +581,7 @@
           <a:p>
             <a:fld id="{4509A250-FF31-4206-8172-F9D3106AACB1}" type="datetimeFigureOut">
               <a:rPr lang="en-US" dirty="0"/>
-              <a:t>3/25/2023</a:t>
+              <a:t>3/26/2023</a:t>
             </a:fld>
             <a:endParaRPr lang="en-US" dirty="0"/>
           </a:p>
@@ -763,7 +770,7 @@
           <a:p>
             <a:fld id="{4509A250-FF31-4206-8172-F9D3106AACB1}" type="datetimeFigureOut">
               <a:rPr lang="en-US" dirty="0"/>
-              <a:t>3/25/2023</a:t>
+              <a:t>3/26/2023</a:t>
             </a:fld>
             <a:endParaRPr lang="en-US" dirty="0"/>
           </a:p>
@@ -1031,7 +1038,7 @@
           <a:p>
             <a:fld id="{4509A250-FF31-4206-8172-F9D3106AACB1}" type="datetimeFigureOut">
               <a:rPr lang="en-US" dirty="0"/>
-              <a:t>3/25/2023</a:t>
+              <a:t>3/26/2023</a:t>
             </a:fld>
             <a:endParaRPr lang="en-US" dirty="0"/>
           </a:p>
@@ -1367,7 +1374,7 @@
           <a:p>
             <a:fld id="{4509A250-FF31-4206-8172-F9D3106AACB1}" type="datetimeFigureOut">
               <a:rPr lang="en-US" dirty="0"/>
-              <a:t>3/25/2023</a:t>
+              <a:t>3/26/2023</a:t>
             </a:fld>
             <a:endParaRPr lang="en-US" dirty="0"/>
           </a:p>
@@ -1985,7 +1992,7 @@
           <a:p>
             <a:fld id="{4509A250-FF31-4206-8172-F9D3106AACB1}" type="datetimeFigureOut">
               <a:rPr lang="en-US" dirty="0"/>
-              <a:t>3/25/2023</a:t>
+              <a:t>3/26/2023</a:t>
             </a:fld>
             <a:endParaRPr lang="en-US" dirty="0"/>
           </a:p>
@@ -2840,7 +2847,7 @@
           <a:p>
             <a:fld id="{4509A250-FF31-4206-8172-F9D3106AACB1}" type="datetimeFigureOut">
               <a:rPr lang="en-US" dirty="0"/>
-              <a:t>3/25/2023</a:t>
+              <a:t>3/26/2023</a:t>
             </a:fld>
             <a:endParaRPr lang="en-US" dirty="0"/>
           </a:p>
@@ -3005,7 +3012,7 @@
           <a:p>
             <a:fld id="{4509A250-FF31-4206-8172-F9D3106AACB1}" type="datetimeFigureOut">
               <a:rPr lang="en-US" dirty="0"/>
-              <a:t>3/25/2023</a:t>
+              <a:t>3/26/2023</a:t>
             </a:fld>
             <a:endParaRPr lang="en-US" dirty="0"/>
           </a:p>
@@ -3180,7 +3187,7 @@
           <a:p>
             <a:fld id="{4509A250-FF31-4206-8172-F9D3106AACB1}" type="datetimeFigureOut">
               <a:rPr lang="en-US" dirty="0"/>
-              <a:t>3/25/2023</a:t>
+              <a:t>3/26/2023</a:t>
             </a:fld>
             <a:endParaRPr lang="en-US" dirty="0"/>
           </a:p>
@@ -3345,7 +3352,7 @@
           <a:p>
             <a:fld id="{4509A250-FF31-4206-8172-F9D3106AACB1}" type="datetimeFigureOut">
               <a:rPr lang="en-US" dirty="0"/>
-              <a:t>3/25/2023</a:t>
+              <a:t>3/26/2023</a:t>
             </a:fld>
             <a:endParaRPr lang="en-US" dirty="0"/>
           </a:p>
@@ -3587,7 +3594,7 @@
           <a:p>
             <a:fld id="{9796027F-7875-4030-9381-8BD8C4F21935}" type="datetimeFigureOut">
               <a:rPr lang="en-US" dirty="0"/>
-              <a:t>3/25/2023</a:t>
+              <a:t>3/26/2023</a:t>
             </a:fld>
             <a:endParaRPr lang="en-US" dirty="0"/>
           </a:p>
@@ -3874,7 +3881,7 @@
           <a:p>
             <a:fld id="{9796027F-7875-4030-9381-8BD8C4F21935}" type="datetimeFigureOut">
               <a:rPr lang="en-US" dirty="0"/>
-              <a:t>3/25/2023</a:t>
+              <a:t>3/26/2023</a:t>
             </a:fld>
             <a:endParaRPr lang="en-US" dirty="0"/>
           </a:p>
@@ -4313,7 +4320,7 @@
           <a:p>
             <a:fld id="{9796027F-7875-4030-9381-8BD8C4F21935}" type="datetimeFigureOut">
               <a:rPr lang="en-US" dirty="0"/>
-              <a:t>3/25/2023</a:t>
+              <a:t>3/26/2023</a:t>
             </a:fld>
             <a:endParaRPr lang="en-US" dirty="0"/>
           </a:p>
@@ -4426,7 +4433,7 @@
           <a:p>
             <a:fld id="{4509A250-FF31-4206-8172-F9D3106AACB1}" type="datetimeFigureOut">
               <a:rPr lang="en-US" dirty="0"/>
-              <a:t>3/25/2023</a:t>
+              <a:t>3/26/2023</a:t>
             </a:fld>
             <a:endParaRPr lang="en-US" dirty="0"/>
           </a:p>
@@ -4516,7 +4523,7 @@
           <a:p>
             <a:fld id="{4509A250-FF31-4206-8172-F9D3106AACB1}" type="datetimeFigureOut">
               <a:rPr lang="en-US" dirty="0"/>
-              <a:t>3/25/2023</a:t>
+              <a:t>3/26/2023</a:t>
             </a:fld>
             <a:endParaRPr lang="en-US" dirty="0"/>
           </a:p>
@@ -4790,7 +4797,7 @@
           <a:p>
             <a:fld id="{4509A250-FF31-4206-8172-F9D3106AACB1}" type="datetimeFigureOut">
               <a:rPr lang="en-US" dirty="0"/>
-              <a:t>3/25/2023</a:t>
+              <a:t>3/26/2023</a:t>
             </a:fld>
             <a:endParaRPr lang="en-US" dirty="0"/>
           </a:p>
@@ -5060,7 +5067,7 @@
           <a:p>
             <a:fld id="{4509A250-FF31-4206-8172-F9D3106AACB1}" type="datetimeFigureOut">
               <a:rPr lang="en-US" dirty="0"/>
-              <a:t>3/25/2023</a:t>
+              <a:t>3/26/2023</a:t>
             </a:fld>
             <a:endParaRPr lang="en-US" dirty="0"/>
           </a:p>
@@ -5484,7 +5491,7 @@
           <a:p>
             <a:fld id="{4AAD347D-5ACD-4C99-B74B-A9C85AD731AF}" type="datetimeFigureOut">
               <a:rPr lang="en-US" dirty="0"/>
-              <a:t>3/25/2023</a:t>
+              <a:t>3/26/2023</a:t>
             </a:fld>
             <a:endParaRPr lang="en-US" dirty="0"/>
           </a:p>
@@ -6119,13 +6126,13 @@
   <p:clrMapOvr>
     <a:masterClrMapping/>
   </p:clrMapOvr>
-  <mc:AlternateContent xmlns:mc="http://schemas.openxmlformats.org/markup-compatibility/2006">
-    <mc:Choice xmlns:p15="http://schemas.microsoft.com/office/powerpoint/2012/main" Requires="p15">
+  <mc:AlternateContent xmlns:mc="http://schemas.openxmlformats.org/markup-compatibility/2006" xmlns:p15="http://schemas.microsoft.com/office/powerpoint/2012/main">
+    <mc:Choice Requires="p15">
       <p:transition xmlns:p14="http://schemas.microsoft.com/office/powerpoint/2010/main" spd="slow" p14:dur="6000">
         <p15:prstTrans prst="curtains"/>
       </p:transition>
     </mc:Choice>
-    <mc:Fallback>
+    <mc:Fallback xmlns="">
       <p:transition spd="slow">
         <p:fade/>
       </p:transition>
@@ -6174,7 +6181,7 @@
           <a:p>
             <a:r>
               <a:rPr lang="en-US" dirty="0"/>
-              <a:t>Other Models one could use?</a:t>
+              <a:t>Model Discussion</a:t>
             </a:r>
           </a:p>
         </p:txBody>
@@ -6207,20 +6214,20 @@
     </p:spTree>
     <p:extLst>
       <p:ext uri="{BB962C8B-B14F-4D97-AF65-F5344CB8AC3E}">
-        <p14:creationId xmlns:p14="http://schemas.microsoft.com/office/powerpoint/2010/main" val="2153187645"/>
+        <p14:creationId xmlns:p14="http://schemas.microsoft.com/office/powerpoint/2010/main" val="1285110487"/>
       </p:ext>
     </p:extLst>
   </p:cSld>
   <p:clrMapOvr>
     <a:masterClrMapping/>
   </p:clrMapOvr>
-  <mc:AlternateContent xmlns:mc="http://schemas.openxmlformats.org/markup-compatibility/2006">
-    <mc:Choice xmlns:p15="http://schemas.microsoft.com/office/powerpoint/2012/main" Requires="p15">
+  <mc:AlternateContent xmlns:mc="http://schemas.openxmlformats.org/markup-compatibility/2006" xmlns:p15="http://schemas.microsoft.com/office/powerpoint/2012/main">
+    <mc:Choice Requires="p15">
       <p:transition xmlns:p14="http://schemas.microsoft.com/office/powerpoint/2010/main" spd="slow" p14:dur="1250">
         <p15:prstTrans prst="pageCurlDouble"/>
       </p:transition>
     </mc:Choice>
-    <mc:Fallback>
+    <mc:Fallback xmlns="">
       <p:transition spd="slow">
         <p:fade/>
       </p:transition>
@@ -6269,7 +6276,7 @@
           <a:p>
             <a:r>
               <a:rPr lang="en-US" dirty="0"/>
-              <a:t>Data Visualizations Used</a:t>
+              <a:t>Was the model successful?</a:t>
             </a:r>
           </a:p>
         </p:txBody>
@@ -6302,20 +6309,20 @@
     </p:spTree>
     <p:extLst>
       <p:ext uri="{BB962C8B-B14F-4D97-AF65-F5344CB8AC3E}">
-        <p14:creationId xmlns:p14="http://schemas.microsoft.com/office/powerpoint/2010/main" val="3779245833"/>
+        <p14:creationId xmlns:p14="http://schemas.microsoft.com/office/powerpoint/2010/main" val="3518643634"/>
       </p:ext>
     </p:extLst>
   </p:cSld>
   <p:clrMapOvr>
     <a:masterClrMapping/>
   </p:clrMapOvr>
-  <mc:AlternateContent xmlns:mc="http://schemas.openxmlformats.org/markup-compatibility/2006">
-    <mc:Choice xmlns:p15="http://schemas.microsoft.com/office/powerpoint/2012/main" Requires="p15">
+  <mc:AlternateContent xmlns:mc="http://schemas.openxmlformats.org/markup-compatibility/2006" xmlns:p15="http://schemas.microsoft.com/office/powerpoint/2012/main">
+    <mc:Choice Requires="p15">
       <p:transition xmlns:p14="http://schemas.microsoft.com/office/powerpoint/2010/main" spd="slow" p14:dur="1250">
         <p15:prstTrans prst="pageCurlDouble"/>
       </p:transition>
     </mc:Choice>
-    <mc:Fallback>
+    <mc:Fallback xmlns="">
       <p:transition spd="slow">
         <p:fade/>
       </p:transition>
@@ -6364,6 +6371,196 @@
           <a:p>
             <a:r>
               <a:rPr lang="en-US" dirty="0"/>
+              <a:t>Other Models one could use?</a:t>
+            </a:r>
+          </a:p>
+        </p:txBody>
+      </p:sp>
+      <p:sp>
+        <p:nvSpPr>
+          <p:cNvPr id="3" name="Content Placeholder 2">
+            <a:extLst>
+              <a:ext uri="{FF2B5EF4-FFF2-40B4-BE49-F238E27FC236}">
+                <a16:creationId xmlns:a16="http://schemas.microsoft.com/office/drawing/2014/main" id="{8930942F-6340-1919-A344-1466975B2665}"/>
+              </a:ext>
+            </a:extLst>
+          </p:cNvPr>
+          <p:cNvSpPr>
+            <a:spLocks noGrp="1"/>
+          </p:cNvSpPr>
+          <p:nvPr>
+            <p:ph idx="1"/>
+          </p:nvPr>
+        </p:nvSpPr>
+        <p:spPr/>
+        <p:txBody>
+          <a:bodyPr/>
+          <a:lstStyle/>
+          <a:p>
+            <a:endParaRPr lang="en-US"/>
+          </a:p>
+        </p:txBody>
+      </p:sp>
+    </p:spTree>
+    <p:extLst>
+      <p:ext uri="{BB962C8B-B14F-4D97-AF65-F5344CB8AC3E}">
+        <p14:creationId xmlns:p14="http://schemas.microsoft.com/office/powerpoint/2010/main" val="2153187645"/>
+      </p:ext>
+    </p:extLst>
+  </p:cSld>
+  <p:clrMapOvr>
+    <a:masterClrMapping/>
+  </p:clrMapOvr>
+  <mc:AlternateContent xmlns:mc="http://schemas.openxmlformats.org/markup-compatibility/2006" xmlns:p15="http://schemas.microsoft.com/office/powerpoint/2012/main">
+    <mc:Choice Requires="p15">
+      <p:transition xmlns:p14="http://schemas.microsoft.com/office/powerpoint/2010/main" spd="slow" p14:dur="1250">
+        <p15:prstTrans prst="pageCurlDouble"/>
+      </p:transition>
+    </mc:Choice>
+    <mc:Fallback xmlns="">
+      <p:transition spd="slow">
+        <p:fade/>
+      </p:transition>
+    </mc:Fallback>
+  </mc:AlternateContent>
+</p:sld>
+</file>
+
+<file path=ppt/slides/slide13.xml><?xml version="1.0" encoding="utf-8"?>
+<p:sld xmlns:a="http://schemas.openxmlformats.org/drawingml/2006/main" xmlns:r="http://schemas.openxmlformats.org/officeDocument/2006/relationships" xmlns:p="http://schemas.openxmlformats.org/presentationml/2006/main">
+  <p:cSld>
+    <p:spTree>
+      <p:nvGrpSpPr>
+        <p:cNvPr id="1" name=""/>
+        <p:cNvGrpSpPr/>
+        <p:nvPr/>
+      </p:nvGrpSpPr>
+      <p:grpSpPr>
+        <a:xfrm>
+          <a:off x="0" y="0"/>
+          <a:ext cx="0" cy="0"/>
+          <a:chOff x="0" y="0"/>
+          <a:chExt cx="0" cy="0"/>
+        </a:xfrm>
+      </p:grpSpPr>
+      <p:sp>
+        <p:nvSpPr>
+          <p:cNvPr id="2" name="Title 1">
+            <a:extLst>
+              <a:ext uri="{FF2B5EF4-FFF2-40B4-BE49-F238E27FC236}">
+                <a16:creationId xmlns:a16="http://schemas.microsoft.com/office/drawing/2014/main" id="{58C23109-145E-711C-EE73-C0C5A2EBE81E}"/>
+              </a:ext>
+            </a:extLst>
+          </p:cNvPr>
+          <p:cNvSpPr>
+            <a:spLocks noGrp="1"/>
+          </p:cNvSpPr>
+          <p:nvPr>
+            <p:ph type="title"/>
+          </p:nvPr>
+        </p:nvSpPr>
+        <p:spPr/>
+        <p:txBody>
+          <a:bodyPr/>
+          <a:lstStyle/>
+          <a:p>
+            <a:r>
+              <a:rPr lang="en-US" dirty="0"/>
+              <a:t>Data Visualizations Used</a:t>
+            </a:r>
+          </a:p>
+        </p:txBody>
+      </p:sp>
+      <p:sp>
+        <p:nvSpPr>
+          <p:cNvPr id="3" name="Content Placeholder 2">
+            <a:extLst>
+              <a:ext uri="{FF2B5EF4-FFF2-40B4-BE49-F238E27FC236}">
+                <a16:creationId xmlns:a16="http://schemas.microsoft.com/office/drawing/2014/main" id="{8930942F-6340-1919-A344-1466975B2665}"/>
+              </a:ext>
+            </a:extLst>
+          </p:cNvPr>
+          <p:cNvSpPr>
+            <a:spLocks noGrp="1"/>
+          </p:cNvSpPr>
+          <p:nvPr>
+            <p:ph idx="1"/>
+          </p:nvPr>
+        </p:nvSpPr>
+        <p:spPr/>
+        <p:txBody>
+          <a:bodyPr/>
+          <a:lstStyle/>
+          <a:p>
+            <a:endParaRPr lang="en-US"/>
+          </a:p>
+        </p:txBody>
+      </p:sp>
+    </p:spTree>
+    <p:extLst>
+      <p:ext uri="{BB962C8B-B14F-4D97-AF65-F5344CB8AC3E}">
+        <p14:creationId xmlns:p14="http://schemas.microsoft.com/office/powerpoint/2010/main" val="3779245833"/>
+      </p:ext>
+    </p:extLst>
+  </p:cSld>
+  <p:clrMapOvr>
+    <a:masterClrMapping/>
+  </p:clrMapOvr>
+  <mc:AlternateContent xmlns:mc="http://schemas.openxmlformats.org/markup-compatibility/2006" xmlns:p15="http://schemas.microsoft.com/office/powerpoint/2012/main">
+    <mc:Choice Requires="p15">
+      <p:transition xmlns:p14="http://schemas.microsoft.com/office/powerpoint/2010/main" spd="slow" p14:dur="1250">
+        <p15:prstTrans prst="pageCurlDouble"/>
+      </p:transition>
+    </mc:Choice>
+    <mc:Fallback xmlns="">
+      <p:transition spd="slow">
+        <p:fade/>
+      </p:transition>
+    </mc:Fallback>
+  </mc:AlternateContent>
+</p:sld>
+</file>
+
+<file path=ppt/slides/slide14.xml><?xml version="1.0" encoding="utf-8"?>
+<p:sld xmlns:a="http://schemas.openxmlformats.org/drawingml/2006/main" xmlns:r="http://schemas.openxmlformats.org/officeDocument/2006/relationships" xmlns:p="http://schemas.openxmlformats.org/presentationml/2006/main">
+  <p:cSld>
+    <p:spTree>
+      <p:nvGrpSpPr>
+        <p:cNvPr id="1" name=""/>
+        <p:cNvGrpSpPr/>
+        <p:nvPr/>
+      </p:nvGrpSpPr>
+      <p:grpSpPr>
+        <a:xfrm>
+          <a:off x="0" y="0"/>
+          <a:ext cx="0" cy="0"/>
+          <a:chOff x="0" y="0"/>
+          <a:chExt cx="0" cy="0"/>
+        </a:xfrm>
+      </p:grpSpPr>
+      <p:sp>
+        <p:nvSpPr>
+          <p:cNvPr id="2" name="Title 1">
+            <a:extLst>
+              <a:ext uri="{FF2B5EF4-FFF2-40B4-BE49-F238E27FC236}">
+                <a16:creationId xmlns:a16="http://schemas.microsoft.com/office/drawing/2014/main" id="{58C23109-145E-711C-EE73-C0C5A2EBE81E}"/>
+              </a:ext>
+            </a:extLst>
+          </p:cNvPr>
+          <p:cNvSpPr>
+            <a:spLocks noGrp="1"/>
+          </p:cNvSpPr>
+          <p:nvPr>
+            <p:ph type="title"/>
+          </p:nvPr>
+        </p:nvSpPr>
+        <p:spPr/>
+        <p:txBody>
+          <a:bodyPr/>
+          <a:lstStyle/>
+          <a:p>
+            <a:r>
+              <a:rPr lang="en-US" dirty="0"/>
               <a:t>Questions</a:t>
             </a:r>
           </a:p>
@@ -6414,13 +6611,13 @@
   <p:clrMapOvr>
     <a:masterClrMapping/>
   </p:clrMapOvr>
-  <mc:AlternateContent xmlns:mc="http://schemas.openxmlformats.org/markup-compatibility/2006">
-    <mc:Choice xmlns:p15="http://schemas.microsoft.com/office/powerpoint/2012/main" Requires="p15">
+  <mc:AlternateContent xmlns:mc="http://schemas.openxmlformats.org/markup-compatibility/2006" xmlns:p15="http://schemas.microsoft.com/office/powerpoint/2012/main">
+    <mc:Choice Requires="p15">
       <p:transition xmlns:p14="http://schemas.microsoft.com/office/powerpoint/2010/main" spd="slow" p14:dur="1250">
         <p15:prstTrans prst="pageCurlDouble"/>
       </p:transition>
     </mc:Choice>
-    <mc:Fallback>
+    <mc:Fallback xmlns="">
       <p:transition spd="slow">
         <p:fade/>
       </p:transition>
@@ -6548,13 +6745,13 @@
   <p:clrMapOvr>
     <a:masterClrMapping/>
   </p:clrMapOvr>
-  <mc:AlternateContent xmlns:mc="http://schemas.openxmlformats.org/markup-compatibility/2006">
-    <mc:Choice xmlns:p15="http://schemas.microsoft.com/office/powerpoint/2012/main" Requires="p15">
+  <mc:AlternateContent xmlns:mc="http://schemas.openxmlformats.org/markup-compatibility/2006" xmlns:p15="http://schemas.microsoft.com/office/powerpoint/2012/main">
+    <mc:Choice Requires="p15">
       <p:transition xmlns:p14="http://schemas.microsoft.com/office/powerpoint/2010/main" spd="slow" p14:dur="1250">
         <p15:prstTrans prst="pageCurlDouble"/>
       </p:transition>
     </mc:Choice>
-    <mc:Fallback>
+    <mc:Fallback xmlns="">
       <p:transition spd="slow">
         <p:fade/>
       </p:transition>
@@ -6633,7 +6830,72 @@
           <a:bodyPr/>
           <a:lstStyle/>
           <a:p>
-            <a:endParaRPr lang="en-US"/>
+            <a:r>
+              <a:rPr lang="en-US" dirty="0"/>
+              <a:t>Popularity of NFL</a:t>
+            </a:r>
+          </a:p>
+          <a:p>
+            <a:pPr lvl="1"/>
+            <a:r>
+              <a:rPr lang="en-US" dirty="0"/>
+              <a:t>Fanbases</a:t>
+            </a:r>
+          </a:p>
+          <a:p>
+            <a:pPr lvl="1"/>
+            <a:r>
+              <a:rPr lang="en-US" dirty="0"/>
+              <a:t>Global Game</a:t>
+            </a:r>
+          </a:p>
+          <a:p>
+            <a:pPr lvl="1"/>
+            <a:r>
+              <a:rPr lang="en-US" dirty="0"/>
+              <a:t>Betting</a:t>
+            </a:r>
+          </a:p>
+          <a:p>
+            <a:pPr lvl="1"/>
+            <a:r>
+              <a:rPr lang="en-US" dirty="0"/>
+              <a:t>Fantasy sports</a:t>
+            </a:r>
+          </a:p>
+          <a:p>
+            <a:pPr lvl="1"/>
+            <a:endParaRPr lang="en-US" dirty="0"/>
+          </a:p>
+          <a:p>
+            <a:r>
+              <a:rPr lang="en-US" dirty="0"/>
+              <a:t>Keys to the game</a:t>
+            </a:r>
+          </a:p>
+          <a:p>
+            <a:pPr lvl="1"/>
+            <a:r>
+              <a:rPr lang="en-US" dirty="0"/>
+              <a:t>Strategy</a:t>
+            </a:r>
+          </a:p>
+          <a:p>
+            <a:pPr lvl="1"/>
+            <a:r>
+              <a:rPr lang="en-US" dirty="0"/>
+              <a:t>Coaching</a:t>
+            </a:r>
+          </a:p>
+          <a:p>
+            <a:pPr lvl="1"/>
+            <a:r>
+              <a:rPr lang="en-US" dirty="0"/>
+              <a:t>Team Strengths</a:t>
+            </a:r>
+          </a:p>
+          <a:p>
+            <a:endParaRPr lang="en-US" dirty="0"/>
           </a:p>
         </p:txBody>
       </p:sp>
@@ -6647,13 +6909,13 @@
   <p:clrMapOvr>
     <a:masterClrMapping/>
   </p:clrMapOvr>
-  <mc:AlternateContent xmlns:mc="http://schemas.openxmlformats.org/markup-compatibility/2006">
-    <mc:Choice xmlns:p15="http://schemas.microsoft.com/office/powerpoint/2012/main" Requires="p15">
+  <mc:AlternateContent xmlns:mc="http://schemas.openxmlformats.org/markup-compatibility/2006" xmlns:p15="http://schemas.microsoft.com/office/powerpoint/2012/main">
+    <mc:Choice Requires="p15">
       <p:transition xmlns:p14="http://schemas.microsoft.com/office/powerpoint/2010/main" spd="slow" p14:dur="1250">
         <p15:prstTrans prst="pageCurlDouble"/>
       </p:transition>
     </mc:Choice>
-    <mc:Fallback>
+    <mc:Fallback xmlns="">
       <p:transition spd="slow">
         <p:fade/>
       </p:transition>
@@ -6728,7 +6990,73 @@
           <a:bodyPr/>
           <a:lstStyle/>
           <a:p>
-            <a:endParaRPr lang="en-US"/>
+            <a:r>
+              <a:rPr lang="en-US" dirty="0"/>
+              <a:t>Open ML</a:t>
+            </a:r>
+          </a:p>
+          <a:p>
+            <a:pPr lvl="1"/>
+            <a:r>
+              <a:rPr lang="en-US" dirty="0"/>
+              <a:t>Data Source</a:t>
+            </a:r>
+          </a:p>
+          <a:p>
+            <a:r>
+              <a:rPr lang="en-US" dirty="0"/>
+              <a:t>Quick DBD</a:t>
+            </a:r>
+          </a:p>
+          <a:p>
+            <a:pPr lvl="1"/>
+            <a:r>
+              <a:rPr lang="en-US" dirty="0"/>
+              <a:t>ERD Diagram Creation</a:t>
+            </a:r>
+          </a:p>
+          <a:p>
+            <a:r>
+              <a:rPr lang="en-US" dirty="0"/>
+              <a:t>Python</a:t>
+            </a:r>
+          </a:p>
+          <a:p>
+            <a:pPr lvl="1"/>
+            <a:r>
+              <a:rPr lang="en-US" dirty="0"/>
+              <a:t>Cleaning Data</a:t>
+            </a:r>
+          </a:p>
+          <a:p>
+            <a:r>
+              <a:rPr lang="en-US" dirty="0"/>
+              <a:t>AWS</a:t>
+            </a:r>
+          </a:p>
+          <a:p>
+            <a:pPr lvl="1"/>
+            <a:r>
+              <a:rPr lang="en-US" dirty="0"/>
+              <a:t>Server</a:t>
+            </a:r>
+          </a:p>
+          <a:p>
+            <a:r>
+              <a:rPr lang="en-US" dirty="0" err="1"/>
+              <a:t>PGAdmin</a:t>
+            </a:r>
+            <a:endParaRPr lang="en-US" dirty="0"/>
+          </a:p>
+          <a:p>
+            <a:pPr lvl="1"/>
+            <a:r>
+              <a:rPr lang="en-US" dirty="0"/>
+              <a:t>SQL</a:t>
+            </a:r>
+          </a:p>
+          <a:p>
+            <a:endParaRPr lang="en-US" dirty="0"/>
           </a:p>
         </p:txBody>
       </p:sp>
@@ -6742,13 +7070,13 @@
   <p:clrMapOvr>
     <a:masterClrMapping/>
   </p:clrMapOvr>
-  <mc:AlternateContent xmlns:mc="http://schemas.openxmlformats.org/markup-compatibility/2006">
-    <mc:Choice xmlns:p15="http://schemas.microsoft.com/office/powerpoint/2012/main" Requires="p15">
+  <mc:AlternateContent xmlns:mc="http://schemas.openxmlformats.org/markup-compatibility/2006" xmlns:p15="http://schemas.microsoft.com/office/powerpoint/2012/main">
+    <mc:Choice Requires="p15">
       <p:transition xmlns:p14="http://schemas.microsoft.com/office/powerpoint/2010/main" spd="slow" p14:dur="1250">
         <p15:prstTrans prst="pageCurlDouble"/>
       </p:transition>
     </mc:Choice>
-    <mc:Fallback>
+    <mc:Fallback xmlns="">
       <p:transition spd="slow">
         <p:fade/>
       </p:transition>
@@ -6823,7 +7151,41 @@
           <a:bodyPr/>
           <a:lstStyle/>
           <a:p>
-            <a:endParaRPr lang="en-US"/>
+            <a:r>
+              <a:rPr lang="en-US" dirty="0"/>
+              <a:t>What 3 key metrics a team needs to meet to be the winners of an NFL Game</a:t>
+            </a:r>
+          </a:p>
+          <a:p>
+            <a:pPr lvl="1"/>
+            <a:r>
+              <a:rPr lang="en-US" dirty="0"/>
+              <a:t>Point Scored Differential</a:t>
+            </a:r>
+          </a:p>
+          <a:p>
+            <a:pPr lvl="1"/>
+            <a:r>
+              <a:rPr lang="en-US" dirty="0"/>
+              <a:t>Turnover Differential</a:t>
+            </a:r>
+          </a:p>
+          <a:p>
+            <a:pPr lvl="1"/>
+            <a:r>
+              <a:rPr lang="en-US" dirty="0"/>
+              <a:t>Time of Possession</a:t>
+            </a:r>
+          </a:p>
+          <a:p>
+            <a:pPr lvl="1"/>
+            <a:endParaRPr lang="en-US" dirty="0"/>
+          </a:p>
+          <a:p>
+            <a:pPr marL="457200" lvl="1" indent="0">
+              <a:buNone/>
+            </a:pPr>
+            <a:endParaRPr lang="en-US" dirty="0"/>
           </a:p>
         </p:txBody>
       </p:sp>
@@ -6837,13 +7199,13 @@
   <p:clrMapOvr>
     <a:masterClrMapping/>
   </p:clrMapOvr>
-  <mc:AlternateContent xmlns:mc="http://schemas.openxmlformats.org/markup-compatibility/2006">
-    <mc:Choice xmlns:p15="http://schemas.microsoft.com/office/powerpoint/2012/main" Requires="p15">
+  <mc:AlternateContent xmlns:mc="http://schemas.openxmlformats.org/markup-compatibility/2006" xmlns:p15="http://schemas.microsoft.com/office/powerpoint/2012/main">
+    <mc:Choice Requires="p15">
       <p:transition xmlns:p14="http://schemas.microsoft.com/office/powerpoint/2010/main" spd="slow" p14:dur="1250">
         <p15:prstTrans prst="pageCurlDouble"/>
       </p:transition>
     </mc:Choice>
-    <mc:Fallback>
+    <mc:Fallback xmlns="">
       <p:transition spd="slow">
         <p:fade/>
       </p:transition>
@@ -6918,7 +7280,29 @@
           <a:bodyPr/>
           <a:lstStyle/>
           <a:p>
-            <a:endParaRPr lang="en-US"/>
+            <a:r>
+              <a:rPr lang="en-US" dirty="0"/>
+              <a:t>NFL Game Statistics from ESPN from 2002 to 2022 season</a:t>
+            </a:r>
+          </a:p>
+          <a:p>
+            <a:endParaRPr lang="en-US" dirty="0"/>
+          </a:p>
+          <a:p>
+            <a:r>
+              <a:rPr lang="en-US" dirty="0"/>
+              <a:t>Focus on the 3 statistics</a:t>
+            </a:r>
+          </a:p>
+          <a:p>
+            <a:pPr lvl="1"/>
+            <a:r>
+              <a:rPr lang="en-US" dirty="0"/>
+              <a:t>Others included in the dataset</a:t>
+            </a:r>
+          </a:p>
+          <a:p>
+            <a:endParaRPr lang="en-US" dirty="0"/>
           </a:p>
         </p:txBody>
       </p:sp>
@@ -6932,13 +7316,13 @@
   <p:clrMapOvr>
     <a:masterClrMapping/>
   </p:clrMapOvr>
-  <mc:AlternateContent xmlns:mc="http://schemas.openxmlformats.org/markup-compatibility/2006">
-    <mc:Choice xmlns:p15="http://schemas.microsoft.com/office/powerpoint/2012/main" Requires="p15">
+  <mc:AlternateContent xmlns:mc="http://schemas.openxmlformats.org/markup-compatibility/2006" xmlns:p15="http://schemas.microsoft.com/office/powerpoint/2012/main">
+    <mc:Choice Requires="p15">
       <p:transition xmlns:p14="http://schemas.microsoft.com/office/powerpoint/2010/main" spd="slow" p14:dur="1250">
         <p15:prstTrans prst="pageCurlDouble"/>
       </p:transition>
     </mc:Choice>
-    <mc:Fallback>
+    <mc:Fallback xmlns="">
       <p:transition spd="slow">
         <p:fade/>
       </p:transition>
@@ -6969,6 +7353,116 @@
           <p:cNvPr id="2" name="Title 1">
             <a:extLst>
               <a:ext uri="{FF2B5EF4-FFF2-40B4-BE49-F238E27FC236}">
+                <a16:creationId xmlns:a16="http://schemas.microsoft.com/office/drawing/2014/main" id="{817198EB-08BB-F9D0-3958-3296E3FA074E}"/>
+              </a:ext>
+            </a:extLst>
+          </p:cNvPr>
+          <p:cNvSpPr>
+            <a:spLocks noGrp="1"/>
+          </p:cNvSpPr>
+          <p:nvPr>
+            <p:ph type="title"/>
+          </p:nvPr>
+        </p:nvSpPr>
+        <p:spPr/>
+        <p:txBody>
+          <a:bodyPr/>
+          <a:lstStyle/>
+          <a:p>
+            <a:r>
+              <a:rPr lang="en-US" dirty="0"/>
+              <a:t>Data Exploration </a:t>
+            </a:r>
+          </a:p>
+        </p:txBody>
+      </p:sp>
+      <p:sp>
+        <p:nvSpPr>
+          <p:cNvPr id="3" name="Content Placeholder 2">
+            <a:extLst>
+              <a:ext uri="{FF2B5EF4-FFF2-40B4-BE49-F238E27FC236}">
+                <a16:creationId xmlns:a16="http://schemas.microsoft.com/office/drawing/2014/main" id="{273FC4D6-A6C3-896B-358E-183723752C9F}"/>
+              </a:ext>
+            </a:extLst>
+          </p:cNvPr>
+          <p:cNvSpPr>
+            <a:spLocks noGrp="1"/>
+          </p:cNvSpPr>
+          <p:nvPr>
+            <p:ph idx="1"/>
+          </p:nvPr>
+        </p:nvSpPr>
+        <p:spPr/>
+        <p:txBody>
+          <a:bodyPr/>
+          <a:lstStyle/>
+          <a:p>
+            <a:r>
+              <a:rPr lang="en-US" dirty="0"/>
+              <a:t>Cleaning Data</a:t>
+            </a:r>
+          </a:p>
+          <a:p>
+            <a:pPr lvl="1"/>
+            <a:r>
+              <a:rPr lang="en-US" dirty="0"/>
+              <a:t>Only Keeping needed columns</a:t>
+            </a:r>
+          </a:p>
+          <a:p>
+            <a:pPr lvl="1"/>
+            <a:r>
+              <a:rPr lang="en-US" b="1" dirty="0">
+                <a:solidFill>
+                  <a:srgbClr val="FF0000"/>
+                </a:solidFill>
+                <a:highlight>
+                  <a:srgbClr val="FFFF00"/>
+                </a:highlight>
+              </a:rPr>
+              <a:t>Conversions or none required?</a:t>
+            </a:r>
+          </a:p>
+          <a:p>
+            <a:endParaRPr lang="en-US" dirty="0"/>
+          </a:p>
+        </p:txBody>
+      </p:sp>
+    </p:spTree>
+    <p:extLst>
+      <p:ext uri="{BB962C8B-B14F-4D97-AF65-F5344CB8AC3E}">
+        <p14:creationId xmlns:p14="http://schemas.microsoft.com/office/powerpoint/2010/main" val="2384806544"/>
+      </p:ext>
+    </p:extLst>
+  </p:cSld>
+  <p:clrMapOvr>
+    <a:masterClrMapping/>
+  </p:clrMapOvr>
+</p:sld>
+</file>
+
+<file path=ppt/slides/slide8.xml><?xml version="1.0" encoding="utf-8"?>
+<p:sld xmlns:a="http://schemas.openxmlformats.org/drawingml/2006/main" xmlns:r="http://schemas.openxmlformats.org/officeDocument/2006/relationships" xmlns:p="http://schemas.openxmlformats.org/presentationml/2006/main">
+  <p:cSld>
+    <p:spTree>
+      <p:nvGrpSpPr>
+        <p:cNvPr id="1" name=""/>
+        <p:cNvGrpSpPr/>
+        <p:nvPr/>
+      </p:nvGrpSpPr>
+      <p:grpSpPr>
+        <a:xfrm>
+          <a:off x="0" y="0"/>
+          <a:ext cx="0" cy="0"/>
+          <a:chOff x="0" y="0"/>
+          <a:chExt cx="0" cy="0"/>
+        </a:xfrm>
+      </p:grpSpPr>
+      <p:sp>
+        <p:nvSpPr>
+          <p:cNvPr id="2" name="Title 1">
+            <a:extLst>
+              <a:ext uri="{FF2B5EF4-FFF2-40B4-BE49-F238E27FC236}">
                 <a16:creationId xmlns:a16="http://schemas.microsoft.com/office/drawing/2014/main" id="{58C23109-145E-711C-EE73-C0C5A2EBE81E}"/>
               </a:ext>
             </a:extLst>
@@ -7031,108 +7525,13 @@
   <p:clrMapOvr>
     <a:masterClrMapping/>
   </p:clrMapOvr>
-  <mc:AlternateContent xmlns:mc="http://schemas.openxmlformats.org/markup-compatibility/2006">
-    <mc:Choice xmlns:p15="http://schemas.microsoft.com/office/powerpoint/2012/main" Requires="p15">
+  <mc:AlternateContent xmlns:mc="http://schemas.openxmlformats.org/markup-compatibility/2006" xmlns:p15="http://schemas.microsoft.com/office/powerpoint/2012/main">
+    <mc:Choice Requires="p15">
       <p:transition xmlns:p14="http://schemas.microsoft.com/office/powerpoint/2010/main" spd="slow" p14:dur="1250">
         <p15:prstTrans prst="pageCurlDouble"/>
       </p:transition>
     </mc:Choice>
-    <mc:Fallback>
-      <p:transition spd="slow">
-        <p:fade/>
-      </p:transition>
-    </mc:Fallback>
-  </mc:AlternateContent>
-</p:sld>
-</file>
-
-<file path=ppt/slides/slide8.xml><?xml version="1.0" encoding="utf-8"?>
-<p:sld xmlns:a="http://schemas.openxmlformats.org/drawingml/2006/main" xmlns:r="http://schemas.openxmlformats.org/officeDocument/2006/relationships" xmlns:p="http://schemas.openxmlformats.org/presentationml/2006/main">
-  <p:cSld>
-    <p:spTree>
-      <p:nvGrpSpPr>
-        <p:cNvPr id="1" name=""/>
-        <p:cNvGrpSpPr/>
-        <p:nvPr/>
-      </p:nvGrpSpPr>
-      <p:grpSpPr>
-        <a:xfrm>
-          <a:off x="0" y="0"/>
-          <a:ext cx="0" cy="0"/>
-          <a:chOff x="0" y="0"/>
-          <a:chExt cx="0" cy="0"/>
-        </a:xfrm>
-      </p:grpSpPr>
-      <p:sp>
-        <p:nvSpPr>
-          <p:cNvPr id="2" name="Title 1">
-            <a:extLst>
-              <a:ext uri="{FF2B5EF4-FFF2-40B4-BE49-F238E27FC236}">
-                <a16:creationId xmlns:a16="http://schemas.microsoft.com/office/drawing/2014/main" id="{58C23109-145E-711C-EE73-C0C5A2EBE81E}"/>
-              </a:ext>
-            </a:extLst>
-          </p:cNvPr>
-          <p:cNvSpPr>
-            <a:spLocks noGrp="1"/>
-          </p:cNvSpPr>
-          <p:nvPr>
-            <p:ph type="title"/>
-          </p:nvPr>
-        </p:nvSpPr>
-        <p:spPr/>
-        <p:txBody>
-          <a:bodyPr/>
-          <a:lstStyle/>
-          <a:p>
-            <a:r>
-              <a:rPr lang="en-US" dirty="0"/>
-              <a:t>Model Discussion</a:t>
-            </a:r>
-          </a:p>
-        </p:txBody>
-      </p:sp>
-      <p:sp>
-        <p:nvSpPr>
-          <p:cNvPr id="3" name="Content Placeholder 2">
-            <a:extLst>
-              <a:ext uri="{FF2B5EF4-FFF2-40B4-BE49-F238E27FC236}">
-                <a16:creationId xmlns:a16="http://schemas.microsoft.com/office/drawing/2014/main" id="{8930942F-6340-1919-A344-1466975B2665}"/>
-              </a:ext>
-            </a:extLst>
-          </p:cNvPr>
-          <p:cNvSpPr>
-            <a:spLocks noGrp="1"/>
-          </p:cNvSpPr>
-          <p:nvPr>
-            <p:ph idx="1"/>
-          </p:nvPr>
-        </p:nvSpPr>
-        <p:spPr/>
-        <p:txBody>
-          <a:bodyPr/>
-          <a:lstStyle/>
-          <a:p>
-            <a:endParaRPr lang="en-US"/>
-          </a:p>
-        </p:txBody>
-      </p:sp>
-    </p:spTree>
-    <p:extLst>
-      <p:ext uri="{BB962C8B-B14F-4D97-AF65-F5344CB8AC3E}">
-        <p14:creationId xmlns:p14="http://schemas.microsoft.com/office/powerpoint/2010/main" val="1285110487"/>
-      </p:ext>
-    </p:extLst>
-  </p:cSld>
-  <p:clrMapOvr>
-    <a:masterClrMapping/>
-  </p:clrMapOvr>
-  <mc:AlternateContent xmlns:mc="http://schemas.openxmlformats.org/markup-compatibility/2006">
-    <mc:Choice xmlns:p15="http://schemas.microsoft.com/office/powerpoint/2012/main" Requires="p15">
-      <p:transition xmlns:p14="http://schemas.microsoft.com/office/powerpoint/2010/main" spd="slow" p14:dur="1250">
-        <p15:prstTrans prst="pageCurlDouble"/>
-      </p:transition>
-    </mc:Choice>
-    <mc:Fallback>
+    <mc:Fallback xmlns="">
       <p:transition spd="slow">
         <p:fade/>
       </p:transition>
@@ -7163,7 +7562,7 @@
           <p:cNvPr id="2" name="Title 1">
             <a:extLst>
               <a:ext uri="{FF2B5EF4-FFF2-40B4-BE49-F238E27FC236}">
-                <a16:creationId xmlns:a16="http://schemas.microsoft.com/office/drawing/2014/main" id="{58C23109-145E-711C-EE73-C0C5A2EBE81E}"/>
+                <a16:creationId xmlns:a16="http://schemas.microsoft.com/office/drawing/2014/main" id="{80E526FE-3163-7048-FCA1-38E870BAD3E8}"/>
               </a:ext>
             </a:extLst>
           </p:cNvPr>
@@ -7181,7 +7580,7 @@
           <a:p>
             <a:r>
               <a:rPr lang="en-US" dirty="0"/>
-              <a:t>Was the model successful?</a:t>
+              <a:t>Project Analysis Phase</a:t>
             </a:r>
           </a:p>
         </p:txBody>
@@ -7191,7 +7590,7 @@
           <p:cNvPr id="3" name="Content Placeholder 2">
             <a:extLst>
               <a:ext uri="{FF2B5EF4-FFF2-40B4-BE49-F238E27FC236}">
-                <a16:creationId xmlns:a16="http://schemas.microsoft.com/office/drawing/2014/main" id="{8930942F-6340-1919-A344-1466975B2665}"/>
+                <a16:creationId xmlns:a16="http://schemas.microsoft.com/office/drawing/2014/main" id="{BE9F7AD1-9E1C-4AB6-561A-06B2A57A08B6}"/>
               </a:ext>
             </a:extLst>
           </p:cNvPr>
@@ -7214,25 +7613,13 @@
     </p:spTree>
     <p:extLst>
       <p:ext uri="{BB962C8B-B14F-4D97-AF65-F5344CB8AC3E}">
-        <p14:creationId xmlns:p14="http://schemas.microsoft.com/office/powerpoint/2010/main" val="3518643634"/>
+        <p14:creationId xmlns:p14="http://schemas.microsoft.com/office/powerpoint/2010/main" val="2524297831"/>
       </p:ext>
     </p:extLst>
   </p:cSld>
   <p:clrMapOvr>
     <a:masterClrMapping/>
   </p:clrMapOvr>
-  <mc:AlternateContent xmlns:mc="http://schemas.openxmlformats.org/markup-compatibility/2006">
-    <mc:Choice xmlns:p15="http://schemas.microsoft.com/office/powerpoint/2012/main" Requires="p15">
-      <p:transition xmlns:p14="http://schemas.microsoft.com/office/powerpoint/2010/main" spd="slow" p14:dur="1250">
-        <p15:prstTrans prst="pageCurlDouble"/>
-      </p:transition>
-    </mc:Choice>
-    <mc:Fallback>
-      <p:transition spd="slow">
-        <p:fade/>
-      </p:transition>
-    </mc:Fallback>
-  </mc:AlternateContent>
 </p:sld>
 </file>
 

</xml_diff>